<commit_message>
update vis_utils (following separation from global settings) and overlap.ipynb
</commit_message>
<xml_diff>
--- a/Paths_lidar_learning.pptx
+++ b/Paths_lidar_learning.pptx
@@ -4605,7 +4605,7 @@
           <p:nvPr>
             <p:extLst>
               <p:ext uri="{D42A27DB-BD31-4B8C-83A1-F6EECF244321}">
-                <p14:modId xmlns:p14="http://schemas.microsoft.com/office/powerpoint/2010/main" val="110597261"/>
+                <p14:modId xmlns:p14="http://schemas.microsoft.com/office/powerpoint/2010/main" val="1570867772"/>
               </p:ext>
             </p:extLst>
           </p:nvPr>
@@ -4868,7 +4868,11 @@
                         <a:buChar char="Ø"/>
                       </a:pPr>
                       <a:r>
-                        <a:rPr lang="en-US" sz="1200" dirty="0"/>
+                        <a:rPr lang="en-US" sz="1200" dirty="0">
+                          <a:highlight>
+                            <a:srgbClr val="FFFF00"/>
+                          </a:highlight>
+                        </a:rPr>
                         <a:t>&lt;STATAION_NAME&gt;</a:t>
                       </a:r>
                     </a:p>
@@ -5057,7 +5061,11 @@
                         <a:buChar char="Ø"/>
                       </a:pPr>
                       <a:r>
-                        <a:rPr lang="en-US" sz="1200" dirty="0"/>
+                        <a:rPr lang="en-US" sz="1200" dirty="0">
+                          <a:highlight>
+                            <a:srgbClr val="FFFF00"/>
+                          </a:highlight>
+                        </a:rPr>
                         <a:t>&lt;STATAION_NAME&gt;</a:t>
                       </a:r>
                     </a:p>

</xml_diff>